<commit_message>
math behind pareto distribution
</commit_message>
<xml_diff>
--- a/Presentations/QA - Pareto Principle.pptx
+++ b/Presentations/QA - Pareto Principle.pptx
@@ -220,7 +220,7 @@
           <a:p>
             <a:fld id="{FAF957FC-5175-49AC-8D2B-2F056FFFC1DD}" type="datetimeFigureOut">
               <a:rPr lang="en-US" smtClean="0"/>
-              <a:t>9/13/2017</a:t>
+              <a:t>9/14/2017</a:t>
             </a:fld>
             <a:endParaRPr lang="en-US"/>
           </a:p>
@@ -1006,7 +1006,7 @@
             <a:fld id="{1D8BD707-D9CF-40AE-B4C6-C98DA3205C09}" type="datetimeFigureOut">
               <a:rPr lang="en-US" smtClean="0"/>
               <a:pPr/>
-              <a:t>9/13/2017</a:t>
+              <a:t>9/14/2017</a:t>
             </a:fld>
             <a:endParaRPr lang="en-US"/>
           </a:p>
@@ -1173,7 +1173,7 @@
             <a:fld id="{1D8BD707-D9CF-40AE-B4C6-C98DA3205C09}" type="datetimeFigureOut">
               <a:rPr lang="en-US" smtClean="0"/>
               <a:pPr/>
-              <a:t>9/13/2017</a:t>
+              <a:t>9/14/2017</a:t>
             </a:fld>
             <a:endParaRPr lang="en-US"/>
           </a:p>
@@ -1350,7 +1350,7 @@
             <a:fld id="{1D8BD707-D9CF-40AE-B4C6-C98DA3205C09}" type="datetimeFigureOut">
               <a:rPr lang="en-US" smtClean="0"/>
               <a:pPr/>
-              <a:t>9/13/2017</a:t>
+              <a:t>9/14/2017</a:t>
             </a:fld>
             <a:endParaRPr lang="en-US"/>
           </a:p>
@@ -1517,7 +1517,7 @@
             <a:fld id="{1D8BD707-D9CF-40AE-B4C6-C98DA3205C09}" type="datetimeFigureOut">
               <a:rPr lang="en-US" smtClean="0"/>
               <a:pPr/>
-              <a:t>9/13/2017</a:t>
+              <a:t>9/14/2017</a:t>
             </a:fld>
             <a:endParaRPr lang="en-US"/>
           </a:p>
@@ -1760,7 +1760,7 @@
             <a:fld id="{1D8BD707-D9CF-40AE-B4C6-C98DA3205C09}" type="datetimeFigureOut">
               <a:rPr lang="en-US" smtClean="0"/>
               <a:pPr/>
-              <a:t>9/13/2017</a:t>
+              <a:t>9/14/2017</a:t>
             </a:fld>
             <a:endParaRPr lang="en-US"/>
           </a:p>
@@ -2045,7 +2045,7 @@
             <a:fld id="{1D8BD707-D9CF-40AE-B4C6-C98DA3205C09}" type="datetimeFigureOut">
               <a:rPr lang="en-US" smtClean="0"/>
               <a:pPr/>
-              <a:t>9/13/2017</a:t>
+              <a:t>9/14/2017</a:t>
             </a:fld>
             <a:endParaRPr lang="en-US"/>
           </a:p>
@@ -2464,7 +2464,7 @@
             <a:fld id="{1D8BD707-D9CF-40AE-B4C6-C98DA3205C09}" type="datetimeFigureOut">
               <a:rPr lang="en-US" smtClean="0"/>
               <a:pPr/>
-              <a:t>9/13/2017</a:t>
+              <a:t>9/14/2017</a:t>
             </a:fld>
             <a:endParaRPr lang="en-US"/>
           </a:p>
@@ -2579,7 +2579,7 @@
             <a:fld id="{1D8BD707-D9CF-40AE-B4C6-C98DA3205C09}" type="datetimeFigureOut">
               <a:rPr lang="en-US" smtClean="0"/>
               <a:pPr/>
-              <a:t>9/13/2017</a:t>
+              <a:t>9/14/2017</a:t>
             </a:fld>
             <a:endParaRPr lang="en-US"/>
           </a:p>
@@ -2671,7 +2671,7 @@
             <a:fld id="{1D8BD707-D9CF-40AE-B4C6-C98DA3205C09}" type="datetimeFigureOut">
               <a:rPr lang="en-US" smtClean="0"/>
               <a:pPr/>
-              <a:t>9/13/2017</a:t>
+              <a:t>9/14/2017</a:t>
             </a:fld>
             <a:endParaRPr lang="en-US"/>
           </a:p>
@@ -2945,7 +2945,7 @@
             <a:fld id="{1D8BD707-D9CF-40AE-B4C6-C98DA3205C09}" type="datetimeFigureOut">
               <a:rPr lang="en-US" smtClean="0"/>
               <a:pPr/>
-              <a:t>9/13/2017</a:t>
+              <a:t>9/14/2017</a:t>
             </a:fld>
             <a:endParaRPr lang="en-US"/>
           </a:p>
@@ -3195,7 +3195,7 @@
             <a:fld id="{1D8BD707-D9CF-40AE-B4C6-C98DA3205C09}" type="datetimeFigureOut">
               <a:rPr lang="en-US" smtClean="0"/>
               <a:pPr/>
-              <a:t>9/13/2017</a:t>
+              <a:t>9/14/2017</a:t>
             </a:fld>
             <a:endParaRPr lang="en-US"/>
           </a:p>
@@ -3405,7 +3405,7 @@
             <a:fld id="{1D8BD707-D9CF-40AE-B4C6-C98DA3205C09}" type="datetimeFigureOut">
               <a:rPr lang="en-US" smtClean="0"/>
               <a:pPr/>
-              <a:t>9/13/2017</a:t>
+              <a:t>9/14/2017</a:t>
             </a:fld>
             <a:endParaRPr lang="en-US"/>
           </a:p>
@@ -9844,17 +9844,7 @@
                   </a:schemeClr>
                 </a:solidFill>
               </a:rPr>
-              <a:t>Smoke Test - </a:t>
-            </a:r>
-            <a:r>
-              <a:rPr lang="en-US" dirty="0" smtClean="0">
-                <a:solidFill>
-                  <a:schemeClr val="accent1">
-                    <a:lumMod val="75000"/>
-                  </a:schemeClr>
-                </a:solidFill>
-              </a:rPr>
-              <a:t>Epochs</a:t>
+              <a:t>Smoke Test - Epochs</a:t>
             </a:r>
             <a:endParaRPr lang="en-US" dirty="0">
               <a:solidFill>
@@ -10062,13 +10052,6 @@
               </a:rPr>
               <a:t>Repeat cycle again.</a:t>
             </a:r>
-            <a:endParaRPr lang="en-US" sz="2400" b="1" dirty="0" smtClean="0">
-              <a:solidFill>
-                <a:schemeClr val="accent6">
-                  <a:lumMod val="75000"/>
-                </a:schemeClr>
-              </a:solidFill>
-            </a:endParaRPr>
           </a:p>
         </p:txBody>
       </p:sp>
@@ -10169,13 +10152,6 @@
               </a:rPr>
               <a:t>----------</a:t>
             </a:r>
-            <a:endParaRPr lang="en-US" sz="1400" b="1" dirty="0" smtClean="0">
-              <a:solidFill>
-                <a:schemeClr val="accent6">
-                  <a:lumMod val="75000"/>
-                </a:schemeClr>
-              </a:solidFill>
-            </a:endParaRPr>
           </a:p>
         </p:txBody>
       </p:sp>
@@ -10257,7 +10233,6 @@
               <a:rPr lang="en-US" sz="1400" b="1" dirty="0" smtClean="0"/>
               <a:t>Completed Epoch</a:t>
             </a:r>
-            <a:endParaRPr lang="en-US" sz="1400" b="1" dirty="0" smtClean="0"/>
           </a:p>
         </p:txBody>
       </p:sp>
@@ -10380,7 +10355,6 @@
               <a:rPr lang="en-US" sz="1400" b="1" dirty="0" smtClean="0"/>
               <a:t>Next Epoch</a:t>
             </a:r>
-            <a:endParaRPr lang="en-US" sz="1400" b="1" dirty="0" smtClean="0"/>
           </a:p>
         </p:txBody>
       </p:sp>
@@ -14746,13 +14720,6 @@
               </a:rPr>
               <a:t>   then yes run them.</a:t>
             </a:r>
-            <a:endParaRPr lang="en-US" sz="2800" b="1" dirty="0" smtClean="0">
-              <a:solidFill>
-                <a:schemeClr val="accent5">
-                  <a:lumMod val="75000"/>
-                </a:schemeClr>
-              </a:solidFill>
-            </a:endParaRPr>
           </a:p>
           <a:p>
             <a:pPr lvl="1"/>
@@ -14775,7 +14742,19 @@
                   </a:schemeClr>
                 </a:solidFill>
               </a:rPr>
-              <a:t>If the tests are manual, and you have insufficient resources, prioritize the tests by 20% </a:t>
+              <a:t>If the tests are manual, and you have insufficient resources, prioritize the tests by 20% of tests that are</a:t>
+            </a:r>
+          </a:p>
+          <a:p>
+            <a:r>
+              <a:rPr lang="en-US" sz="2800" b="1" dirty="0">
+                <a:solidFill>
+                  <a:schemeClr val="accent5">
+                    <a:lumMod val="75000"/>
+                  </a:schemeClr>
+                </a:solidFill>
+              </a:rPr>
+              <a:t> </a:t>
             </a:r>
             <a:r>
               <a:rPr lang="en-US" sz="2800" b="1" dirty="0" smtClean="0">
@@ -14785,37 +14764,8 @@
                   </a:schemeClr>
                 </a:solidFill>
               </a:rPr>
-              <a:t>of tests that are</a:t>
-            </a:r>
-          </a:p>
-          <a:p>
-            <a:r>
-              <a:rPr lang="en-US" sz="2800" b="1" dirty="0">
-                <a:solidFill>
-                  <a:schemeClr val="accent5">
-                    <a:lumMod val="75000"/>
-                  </a:schemeClr>
-                </a:solidFill>
-              </a:rPr>
-              <a:t> </a:t>
-            </a:r>
-            <a:r>
-              <a:rPr lang="en-US" sz="2800" b="1" dirty="0" smtClean="0">
-                <a:solidFill>
-                  <a:schemeClr val="accent5">
-                    <a:lumMod val="75000"/>
-                  </a:schemeClr>
-                </a:solidFill>
-              </a:rPr>
               <a:t>  80% of the output, such as:</a:t>
             </a:r>
-            <a:endParaRPr lang="en-US" sz="2800" b="1" dirty="0" smtClean="0">
-              <a:solidFill>
-                <a:schemeClr val="accent5">
-                  <a:lumMod val="75000"/>
-                </a:schemeClr>
-              </a:solidFill>
-            </a:endParaRPr>
           </a:p>
           <a:p>
             <a:pPr marL="742950" lvl="1" indent="-285750">
@@ -14832,13 +14782,6 @@
               </a:rPr>
               <a:t>How likely end-user will do this.</a:t>
             </a:r>
-            <a:endParaRPr lang="en-US" sz="2400" b="1" dirty="0" smtClean="0">
-              <a:solidFill>
-                <a:schemeClr val="accent6">
-                  <a:lumMod val="75000"/>
-                </a:schemeClr>
-              </a:solidFill>
-            </a:endParaRPr>
           </a:p>
           <a:p>
             <a:pPr marL="742950" lvl="1" indent="-285750">
@@ -14855,13 +14798,6 @@
               </a:rPr>
               <a:t>How much of the code does it exercise.</a:t>
             </a:r>
-            <a:endParaRPr lang="en-US" sz="2400" b="1" dirty="0" smtClean="0">
-              <a:solidFill>
-                <a:schemeClr val="accent6">
-                  <a:lumMod val="75000"/>
-                </a:schemeClr>
-              </a:solidFill>
-            </a:endParaRPr>
           </a:p>
           <a:p>
             <a:pPr marL="742950" lvl="1" indent="-285750">
@@ -14894,13 +14830,6 @@
               </a:rPr>
               <a:t>The number of bugs its found historically.</a:t>
             </a:r>
-            <a:endParaRPr lang="en-US" sz="2400" b="1" dirty="0" smtClean="0">
-              <a:solidFill>
-                <a:schemeClr val="accent6">
-                  <a:lumMod val="75000"/>
-                </a:schemeClr>
-              </a:solidFill>
-            </a:endParaRPr>
           </a:p>
         </p:txBody>
       </p:sp>
@@ -15254,13 +15183,6 @@
               </a:rPr>
               <a:t>   consider switching it with a higher ranked test case.</a:t>
             </a:r>
-            <a:endParaRPr lang="en-US" sz="2400" b="1" dirty="0" smtClean="0">
-              <a:solidFill>
-                <a:schemeClr val="accent6">
-                  <a:lumMod val="75000"/>
-                </a:schemeClr>
-              </a:solidFill>
-            </a:endParaRPr>
           </a:p>
         </p:txBody>
       </p:sp>
@@ -15332,17 +15254,7 @@
                   </a:schemeClr>
                 </a:solidFill>
               </a:rPr>
-              <a:t>Acceptance </a:t>
-            </a:r>
-            <a:r>
-              <a:rPr lang="en-US" dirty="0" smtClean="0">
-                <a:solidFill>
-                  <a:schemeClr val="accent1">
-                    <a:lumMod val="75000"/>
-                  </a:schemeClr>
-                </a:solidFill>
-              </a:rPr>
-              <a:t>Test - Sampling Distribution</a:t>
+              <a:t>Acceptance Test - Sampling Distribution</a:t>
             </a:r>
             <a:endParaRPr lang="en-US" dirty="0">
               <a:solidFill>
@@ -15606,13 +15518,6 @@
               </a:rPr>
               <a:t>Assume 1000 selected tests per round. </a:t>
             </a:r>
-            <a:endParaRPr lang="en-US" sz="2400" b="1" dirty="0" smtClean="0">
-              <a:solidFill>
-                <a:schemeClr val="accent5">
-                  <a:lumMod val="75000"/>
-                </a:schemeClr>
-              </a:solidFill>
-            </a:endParaRPr>
           </a:p>
         </p:txBody>
       </p:sp>
@@ -15694,7 +15599,6 @@
               <a:rPr lang="en-US" sz="1400" b="1" dirty="0" smtClean="0"/>
               <a:t>Round 1: 50 bugs</a:t>
             </a:r>
-            <a:endParaRPr lang="en-US" sz="1400" b="1" dirty="0" smtClean="0"/>
           </a:p>
         </p:txBody>
       </p:sp>
@@ -15790,7 +15694,6 @@
               <a:rPr lang="en-US" sz="1400" b="1" dirty="0" smtClean="0"/>
               <a:t>Round 2: 40 bugs</a:t>
             </a:r>
-            <a:endParaRPr lang="en-US" sz="1400" b="1" dirty="0" smtClean="0"/>
           </a:p>
         </p:txBody>
       </p:sp>
@@ -15938,7 +15841,6 @@
               <a:rPr lang="en-US" sz="1400" b="1" dirty="0" smtClean="0"/>
               <a:t>Round N: 6 bugs</a:t>
             </a:r>
-            <a:endParaRPr lang="en-US" sz="1400" b="1" dirty="0" smtClean="0"/>
           </a:p>
         </p:txBody>
       </p:sp>
@@ -18568,7 +18470,7 @@
         </p:spPr>
         <p:txBody>
           <a:bodyPr>
-            <a:normAutofit/>
+            <a:normAutofit fontScale="90000"/>
           </a:bodyPr>
           <a:lstStyle/>
           <a:p>
@@ -18581,7 +18483,17 @@
                   </a:schemeClr>
                 </a:solidFill>
               </a:rPr>
-              <a:t>Predicting Effort</a:t>
+              <a:t>Predicting </a:t>
+            </a:r>
+            <a:r>
+              <a:rPr lang="en-US" dirty="0" smtClean="0">
+                <a:solidFill>
+                  <a:schemeClr val="accent1">
+                    <a:lumMod val="75000"/>
+                  </a:schemeClr>
+                </a:solidFill>
+              </a:rPr>
+              <a:t>Effort – A Bellman Approach</a:t>
             </a:r>
             <a:endParaRPr lang="en-US" dirty="0">
               <a:solidFill>

</xml_diff>